<commit_message>
main window of the application is created
</commit_message>
<xml_diff>
--- a/TBSG.pptx
+++ b/TBSG.pptx
@@ -261,7 +261,7 @@
           <a:p>
             <a:fld id="{998C2EF3-106F-3443-9D02-DC3943033747}" type="datetimeFigureOut">
               <a:rPr lang="en-AT" smtClean="0"/>
-              <a:t>14.04.21</a:t>
+              <a:t>18.04.21</a:t>
             </a:fld>
             <a:endParaRPr lang="en-AT"/>
           </a:p>
@@ -461,7 +461,7 @@
           <a:p>
             <a:fld id="{998C2EF3-106F-3443-9D02-DC3943033747}" type="datetimeFigureOut">
               <a:rPr lang="en-AT" smtClean="0"/>
-              <a:t>14.04.21</a:t>
+              <a:t>18.04.21</a:t>
             </a:fld>
             <a:endParaRPr lang="en-AT"/>
           </a:p>
@@ -671,7 +671,7 @@
           <a:p>
             <a:fld id="{998C2EF3-106F-3443-9D02-DC3943033747}" type="datetimeFigureOut">
               <a:rPr lang="en-AT" smtClean="0"/>
-              <a:t>14.04.21</a:t>
+              <a:t>18.04.21</a:t>
             </a:fld>
             <a:endParaRPr lang="en-AT"/>
           </a:p>
@@ -871,7 +871,7 @@
           <a:p>
             <a:fld id="{998C2EF3-106F-3443-9D02-DC3943033747}" type="datetimeFigureOut">
               <a:rPr lang="en-AT" smtClean="0"/>
-              <a:t>14.04.21</a:t>
+              <a:t>18.04.21</a:t>
             </a:fld>
             <a:endParaRPr lang="en-AT"/>
           </a:p>
@@ -1147,7 +1147,7 @@
           <a:p>
             <a:fld id="{998C2EF3-106F-3443-9D02-DC3943033747}" type="datetimeFigureOut">
               <a:rPr lang="en-AT" smtClean="0"/>
-              <a:t>14.04.21</a:t>
+              <a:t>18.04.21</a:t>
             </a:fld>
             <a:endParaRPr lang="en-AT"/>
           </a:p>
@@ -1415,7 +1415,7 @@
           <a:p>
             <a:fld id="{998C2EF3-106F-3443-9D02-DC3943033747}" type="datetimeFigureOut">
               <a:rPr lang="en-AT" smtClean="0"/>
-              <a:t>14.04.21</a:t>
+              <a:t>18.04.21</a:t>
             </a:fld>
             <a:endParaRPr lang="en-AT"/>
           </a:p>
@@ -1830,7 +1830,7 @@
           <a:p>
             <a:fld id="{998C2EF3-106F-3443-9D02-DC3943033747}" type="datetimeFigureOut">
               <a:rPr lang="en-AT" smtClean="0"/>
-              <a:t>14.04.21</a:t>
+              <a:t>18.04.21</a:t>
             </a:fld>
             <a:endParaRPr lang="en-AT"/>
           </a:p>
@@ -1972,7 +1972,7 @@
           <a:p>
             <a:fld id="{998C2EF3-106F-3443-9D02-DC3943033747}" type="datetimeFigureOut">
               <a:rPr lang="en-AT" smtClean="0"/>
-              <a:t>14.04.21</a:t>
+              <a:t>18.04.21</a:t>
             </a:fld>
             <a:endParaRPr lang="en-AT"/>
           </a:p>
@@ -2085,7 +2085,7 @@
           <a:p>
             <a:fld id="{998C2EF3-106F-3443-9D02-DC3943033747}" type="datetimeFigureOut">
               <a:rPr lang="en-AT" smtClean="0"/>
-              <a:t>14.04.21</a:t>
+              <a:t>18.04.21</a:t>
             </a:fld>
             <a:endParaRPr lang="en-AT"/>
           </a:p>
@@ -2398,7 +2398,7 @@
           <a:p>
             <a:fld id="{998C2EF3-106F-3443-9D02-DC3943033747}" type="datetimeFigureOut">
               <a:rPr lang="en-AT" smtClean="0"/>
-              <a:t>14.04.21</a:t>
+              <a:t>18.04.21</a:t>
             </a:fld>
             <a:endParaRPr lang="en-AT"/>
           </a:p>
@@ -2687,7 +2687,7 @@
           <a:p>
             <a:fld id="{998C2EF3-106F-3443-9D02-DC3943033747}" type="datetimeFigureOut">
               <a:rPr lang="en-AT" smtClean="0"/>
-              <a:t>14.04.21</a:t>
+              <a:t>18.04.21</a:t>
             </a:fld>
             <a:endParaRPr lang="en-AT"/>
           </a:p>
@@ -2930,7 +2930,7 @@
           <a:p>
             <a:fld id="{998C2EF3-106F-3443-9D02-DC3943033747}" type="datetimeFigureOut">
               <a:rPr lang="en-AT" smtClean="0"/>
-              <a:t>14.04.21</a:t>
+              <a:t>18.04.21</a:t>
             </a:fld>
             <a:endParaRPr lang="en-AT"/>
           </a:p>
@@ -3355,204 +3355,226 @@
           <a:chExt cx="0" cy="0"/>
         </a:xfrm>
       </p:grpSpPr>
-      <p:sp>
-        <p:nvSpPr>
-          <p:cNvPr id="4" name="Rectangular Callout 3">
-            <a:extLst>
-              <a:ext uri="{FF2B5EF4-FFF2-40B4-BE49-F238E27FC236}">
-                <a16:creationId xmlns:a16="http://schemas.microsoft.com/office/drawing/2014/main" id="{67FE21FC-02F7-0E4E-BA59-E433DB564155}"/>
-              </a:ext>
-            </a:extLst>
-          </p:cNvPr>
-          <p:cNvSpPr/>
+      <p:grpSp>
+        <p:nvGrpSpPr>
+          <p:cNvPr id="3" name="Group 2">
+            <a:extLst>
+              <a:ext uri="{FF2B5EF4-FFF2-40B4-BE49-F238E27FC236}">
+                <a16:creationId xmlns:a16="http://schemas.microsoft.com/office/drawing/2014/main" id="{53181CB2-B26E-2348-9EF7-DFD45DB0D07A}"/>
+              </a:ext>
+            </a:extLst>
+          </p:cNvPr>
+          <p:cNvGrpSpPr/>
           <p:nvPr/>
-        </p:nvSpPr>
-        <p:spPr>
+        </p:nvGrpSpPr>
+        <p:grpSpPr>
           <a:xfrm>
-            <a:off x="4848447" y="1636295"/>
-            <a:ext cx="1850065" cy="1170700"/>
+            <a:off x="3380834" y="1636295"/>
+            <a:ext cx="4785284" cy="2869929"/>
+            <a:chOff x="3380834" y="1636295"/>
+            <a:chExt cx="4785284" cy="2869929"/>
           </a:xfrm>
-          <a:prstGeom prst="wedgeRectCallout">
-            <a:avLst>
-              <a:gd name="adj1" fmla="val -33477"/>
-              <a:gd name="adj2" fmla="val 75344"/>
-            </a:avLst>
-          </a:prstGeom>
-          <a:solidFill>
-            <a:srgbClr val="D24848"/>
-          </a:solidFill>
-          <a:ln>
+        </p:grpSpPr>
+        <p:sp>
+          <p:nvSpPr>
+            <p:cNvPr id="4" name="Rectangular Callout 3">
+              <a:extLst>
+                <a:ext uri="{FF2B5EF4-FFF2-40B4-BE49-F238E27FC236}">
+                  <a16:creationId xmlns:a16="http://schemas.microsoft.com/office/drawing/2014/main" id="{67FE21FC-02F7-0E4E-BA59-E433DB564155}"/>
+                </a:ext>
+              </a:extLst>
+            </p:cNvPr>
+            <p:cNvSpPr/>
+            <p:nvPr/>
+          </p:nvSpPr>
+          <p:spPr>
+            <a:xfrm>
+              <a:off x="4848447" y="1636295"/>
+              <a:ext cx="1850065" cy="1170700"/>
+            </a:xfrm>
+            <a:prstGeom prst="wedgeRectCallout">
+              <a:avLst>
+                <a:gd name="adj1" fmla="val -33477"/>
+                <a:gd name="adj2" fmla="val 75344"/>
+              </a:avLst>
+            </a:prstGeom>
+            <a:solidFill>
+              <a:srgbClr val="D24848"/>
+            </a:solidFill>
+            <a:ln>
+              <a:noFill/>
+            </a:ln>
+          </p:spPr>
+          <p:style>
+            <a:lnRef idx="2">
+              <a:schemeClr val="accent1">
+                <a:shade val="50000"/>
+              </a:schemeClr>
+            </a:lnRef>
+            <a:fillRef idx="1">
+              <a:schemeClr val="accent1"/>
+            </a:fillRef>
+            <a:effectRef idx="0">
+              <a:schemeClr val="accent1"/>
+            </a:effectRef>
+            <a:fontRef idx="minor">
+              <a:schemeClr val="lt1"/>
+            </a:fontRef>
+          </p:style>
+          <p:txBody>
+            <a:bodyPr rtlCol="0" anchor="ctr"/>
+            <a:lstStyle/>
+            <a:p>
+              <a:pPr algn="ctr"/>
+              <a:endParaRPr lang="en-AT" sz="13800" dirty="0">
+                <a:latin typeface="Hiragino Kaku Gothic Std W8" panose="020B0800000000000000" pitchFamily="34" charset="-128"/>
+                <a:ea typeface="Hiragino Kaku Gothic Std W8" panose="020B0800000000000000" pitchFamily="34" charset="-128"/>
+                <a:cs typeface="Aharoni" panose="020F0502020204030204" pitchFamily="34" charset="0"/>
+              </a:endParaRPr>
+            </a:p>
+          </p:txBody>
+        </p:sp>
+        <p:sp>
+          <p:nvSpPr>
+            <p:cNvPr id="6" name="TextBox 5">
+              <a:extLst>
+                <a:ext uri="{FF2B5EF4-FFF2-40B4-BE49-F238E27FC236}">
+                  <a16:creationId xmlns:a16="http://schemas.microsoft.com/office/drawing/2014/main" id="{CF30B3EB-B153-5846-B0A0-42EC2ECC5E0D}"/>
+                </a:ext>
+              </a:extLst>
+            </p:cNvPr>
+            <p:cNvSpPr txBox="1"/>
+            <p:nvPr/>
+          </p:nvSpPr>
+          <p:spPr>
+            <a:xfrm>
+              <a:off x="5329284" y="1765864"/>
+              <a:ext cx="888385" cy="1569660"/>
+            </a:xfrm>
+            <a:prstGeom prst="rect">
+              <a:avLst/>
+            </a:prstGeom>
             <a:noFill/>
-          </a:ln>
-        </p:spPr>
-        <p:style>
-          <a:lnRef idx="2">
-            <a:schemeClr val="accent1">
-              <a:shade val="50000"/>
-            </a:schemeClr>
-          </a:lnRef>
-          <a:fillRef idx="1">
-            <a:schemeClr val="accent1"/>
-          </a:fillRef>
-          <a:effectRef idx="0">
-            <a:schemeClr val="accent1"/>
-          </a:effectRef>
-          <a:fontRef idx="minor">
-            <a:schemeClr val="lt1"/>
-          </a:fontRef>
-        </p:style>
-        <p:txBody>
-          <a:bodyPr rtlCol="0" anchor="ctr"/>
-          <a:lstStyle/>
-          <a:p>
-            <a:pPr algn="ctr"/>
-            <a:endParaRPr lang="en-AT" sz="13800" dirty="0">
-              <a:latin typeface="Hiragino Kaku Gothic Std W8" panose="020B0800000000000000" pitchFamily="34" charset="-128"/>
-              <a:ea typeface="Hiragino Kaku Gothic Std W8" panose="020B0800000000000000" pitchFamily="34" charset="-128"/>
-              <a:cs typeface="Aharoni" panose="020F0502020204030204" pitchFamily="34" charset="0"/>
-            </a:endParaRPr>
-          </a:p>
-        </p:txBody>
-      </p:sp>
-      <p:sp>
-        <p:nvSpPr>
-          <p:cNvPr id="6" name="TextBox 5">
-            <a:extLst>
-              <a:ext uri="{FF2B5EF4-FFF2-40B4-BE49-F238E27FC236}">
-                <a16:creationId xmlns:a16="http://schemas.microsoft.com/office/drawing/2014/main" id="{CF30B3EB-B153-5846-B0A0-42EC2ECC5E0D}"/>
-              </a:ext>
-            </a:extLst>
-          </p:cNvPr>
-          <p:cNvSpPr txBox="1"/>
-          <p:nvPr/>
-        </p:nvSpPr>
-        <p:spPr>
-          <a:xfrm>
-            <a:off x="5329284" y="1765864"/>
-            <a:ext cx="888385" cy="1569660"/>
-          </a:xfrm>
-          <a:prstGeom prst="rect">
-            <a:avLst/>
-          </a:prstGeom>
-          <a:noFill/>
-        </p:spPr>
-        <p:txBody>
-          <a:bodyPr wrap="none" rtlCol="0">
-            <a:spAutoFit/>
-          </a:bodyPr>
-          <a:lstStyle/>
-          <a:p>
-            <a:r>
-              <a:rPr lang="en-AT" sz="9600" dirty="0">
+          </p:spPr>
+          <p:txBody>
+            <a:bodyPr wrap="none" rtlCol="0">
+              <a:spAutoFit/>
+            </a:bodyPr>
+            <a:lstStyle/>
+            <a:p>
+              <a:pPr algn="ctr"/>
+              <a:r>
+                <a:rPr lang="en-AT" sz="9600" dirty="0">
+                  <a:solidFill>
+                    <a:schemeClr val="bg1"/>
+                  </a:solidFill>
+                  <a:latin typeface="Hiragino Kaku Gothic Std W8" panose="020B0800000000000000" pitchFamily="34" charset="-128"/>
+                  <a:ea typeface="Hiragino Kaku Gothic Std W8" panose="020B0800000000000000" pitchFamily="34" charset="-128"/>
+                  <a:cs typeface="Aharoni" panose="020F0502020204030204" pitchFamily="34" charset="0"/>
+                </a:rPr>
+                <a:t>”</a:t>
+              </a:r>
+              <a:endParaRPr lang="en-AT" dirty="0">
                 <a:solidFill>
                   <a:schemeClr val="bg1"/>
                 </a:solidFill>
-                <a:latin typeface="Hiragino Kaku Gothic Std W8" panose="020B0800000000000000" pitchFamily="34" charset="-128"/>
-                <a:ea typeface="Hiragino Kaku Gothic Std W8" panose="020B0800000000000000" pitchFamily="34" charset="-128"/>
-                <a:cs typeface="Aharoni" panose="020F0502020204030204" pitchFamily="34" charset="0"/>
-              </a:rPr>
-              <a:t>”</a:t>
-            </a:r>
-            <a:endParaRPr lang="en-AT" dirty="0">
-              <a:solidFill>
-                <a:schemeClr val="bg1"/>
-              </a:solidFill>
-            </a:endParaRPr>
-          </a:p>
-        </p:txBody>
-      </p:sp>
-      <p:sp>
-        <p:nvSpPr>
-          <p:cNvPr id="8" name="TextBox 7">
-            <a:extLst>
-              <a:ext uri="{FF2B5EF4-FFF2-40B4-BE49-F238E27FC236}">
-                <a16:creationId xmlns:a16="http://schemas.microsoft.com/office/drawing/2014/main" id="{4BA8D774-2455-2D43-A694-FC5935DF6F3B}"/>
-              </a:ext>
-            </a:extLst>
-          </p:cNvPr>
-          <p:cNvSpPr txBox="1"/>
-          <p:nvPr/>
-        </p:nvSpPr>
-        <p:spPr>
-          <a:xfrm>
-            <a:off x="4021233" y="2936564"/>
-            <a:ext cx="3504486" cy="1569660"/>
-          </a:xfrm>
-          <a:prstGeom prst="rect">
-            <a:avLst/>
-          </a:prstGeom>
-          <a:noFill/>
-        </p:spPr>
-        <p:txBody>
-          <a:bodyPr wrap="none" rtlCol="0">
-            <a:spAutoFit/>
-          </a:bodyPr>
-          <a:lstStyle/>
-          <a:p>
-            <a:pPr algn="ctr"/>
-            <a:r>
-              <a:rPr lang="en-AT" sz="9600" dirty="0">
+              </a:endParaRPr>
+            </a:p>
+          </p:txBody>
+        </p:sp>
+        <p:sp>
+          <p:nvSpPr>
+            <p:cNvPr id="8" name="TextBox 7">
+              <a:extLst>
+                <a:ext uri="{FF2B5EF4-FFF2-40B4-BE49-F238E27FC236}">
+                  <a16:creationId xmlns:a16="http://schemas.microsoft.com/office/drawing/2014/main" id="{4BA8D774-2455-2D43-A694-FC5935DF6F3B}"/>
+                </a:ext>
+              </a:extLst>
+            </p:cNvPr>
+            <p:cNvSpPr txBox="1"/>
+            <p:nvPr/>
+          </p:nvSpPr>
+          <p:spPr>
+            <a:xfrm>
+              <a:off x="4021233" y="2936564"/>
+              <a:ext cx="3504486" cy="1569660"/>
+            </a:xfrm>
+            <a:prstGeom prst="rect">
+              <a:avLst/>
+            </a:prstGeom>
+            <a:noFill/>
+          </p:spPr>
+          <p:txBody>
+            <a:bodyPr wrap="none" rtlCol="0">
+              <a:spAutoFit/>
+            </a:bodyPr>
+            <a:lstStyle/>
+            <a:p>
+              <a:pPr algn="ctr"/>
+              <a:r>
+                <a:rPr lang="en-AT" sz="9600" dirty="0">
+                  <a:solidFill>
+                    <a:srgbClr val="3A3B6B"/>
+                  </a:solidFill>
+                  <a:latin typeface="Montserrat" panose="02000505000000020004" pitchFamily="2" charset="77"/>
+                  <a:ea typeface="Heiti SC Medium" pitchFamily="2" charset="-128"/>
+                  <a:cs typeface="Mangal" panose="02040503050203030202" pitchFamily="18" charset="0"/>
+                </a:rPr>
+                <a:t>TBSG</a:t>
+              </a:r>
+              <a:endParaRPr lang="en-AT" dirty="0">
                 <a:solidFill>
                   <a:srgbClr val="3A3B6B"/>
                 </a:solidFill>
                 <a:latin typeface="Montserrat" panose="02000505000000020004" pitchFamily="2" charset="77"/>
                 <a:ea typeface="Heiti SC Medium" pitchFamily="2" charset="-128"/>
                 <a:cs typeface="Mangal" panose="02040503050203030202" pitchFamily="18" charset="0"/>
-              </a:rPr>
-              <a:t>TBSG</a:t>
-            </a:r>
-            <a:endParaRPr lang="en-AT" dirty="0">
-              <a:solidFill>
-                <a:srgbClr val="3A3B6B"/>
-              </a:solidFill>
-              <a:latin typeface="Montserrat" panose="02000505000000020004" pitchFamily="2" charset="77"/>
-              <a:ea typeface="Heiti SC Medium" pitchFamily="2" charset="-128"/>
-              <a:cs typeface="Mangal" panose="02040503050203030202" pitchFamily="18" charset="0"/>
-            </a:endParaRPr>
-          </a:p>
-        </p:txBody>
-      </p:sp>
-      <p:sp>
-        <p:nvSpPr>
-          <p:cNvPr id="2" name="TextBox 1">
-            <a:extLst>
-              <a:ext uri="{FF2B5EF4-FFF2-40B4-BE49-F238E27FC236}">
-                <a16:creationId xmlns:a16="http://schemas.microsoft.com/office/drawing/2014/main" id="{92F4D9CB-7231-284B-AE4E-79A7FE02C666}"/>
-              </a:ext>
-            </a:extLst>
-          </p:cNvPr>
-          <p:cNvSpPr txBox="1"/>
-          <p:nvPr/>
-        </p:nvSpPr>
-        <p:spPr>
-          <a:xfrm>
-            <a:off x="3380834" y="4229225"/>
-            <a:ext cx="4785284" cy="276999"/>
-          </a:xfrm>
-          <a:prstGeom prst="rect">
-            <a:avLst/>
-          </a:prstGeom>
-          <a:noFill/>
-        </p:spPr>
-        <p:txBody>
-          <a:bodyPr wrap="none" rtlCol="0">
-            <a:spAutoFit/>
-          </a:bodyPr>
-          <a:lstStyle/>
-          <a:p>
-            <a:pPr algn="ctr"/>
-            <a:r>
-              <a:rPr lang="en-AT" sz="1200" spc="300" dirty="0">
-                <a:solidFill>
-                  <a:srgbClr val="D24848"/>
-                </a:solidFill>
-                <a:latin typeface="Montserrat" panose="02000505000000020004" pitchFamily="2" charset="77"/>
-              </a:rPr>
-              <a:t>the management communication advisor</a:t>
-            </a:r>
-          </a:p>
-        </p:txBody>
-      </p:sp>
+              </a:endParaRPr>
+            </a:p>
+          </p:txBody>
+        </p:sp>
+        <p:sp>
+          <p:nvSpPr>
+            <p:cNvPr id="2" name="TextBox 1">
+              <a:extLst>
+                <a:ext uri="{FF2B5EF4-FFF2-40B4-BE49-F238E27FC236}">
+                  <a16:creationId xmlns:a16="http://schemas.microsoft.com/office/drawing/2014/main" id="{92F4D9CB-7231-284B-AE4E-79A7FE02C666}"/>
+                </a:ext>
+              </a:extLst>
+            </p:cNvPr>
+            <p:cNvSpPr txBox="1"/>
+            <p:nvPr/>
+          </p:nvSpPr>
+          <p:spPr>
+            <a:xfrm>
+              <a:off x="3380834" y="4229225"/>
+              <a:ext cx="4785284" cy="276999"/>
+            </a:xfrm>
+            <a:prstGeom prst="rect">
+              <a:avLst/>
+            </a:prstGeom>
+            <a:noFill/>
+          </p:spPr>
+          <p:txBody>
+            <a:bodyPr wrap="none" rtlCol="0">
+              <a:spAutoFit/>
+            </a:bodyPr>
+            <a:lstStyle/>
+            <a:p>
+              <a:pPr algn="ctr"/>
+              <a:r>
+                <a:rPr lang="en-AT" sz="1200" spc="300" dirty="0">
+                  <a:solidFill>
+                    <a:srgbClr val="D24848"/>
+                  </a:solidFill>
+                  <a:latin typeface="Montserrat" panose="02000505000000020004" pitchFamily="2" charset="77"/>
+                </a:rPr>
+                <a:t>the management communication advisor</a:t>
+              </a:r>
+            </a:p>
+          </p:txBody>
+        </p:sp>
+      </p:grpSp>
     </p:spTree>
     <p:extLst>
       <p:ext uri="{BB962C8B-B14F-4D97-AF65-F5344CB8AC3E}">

</xml_diff>